<commit_message>
Python wk 3.1 instrucor notes Nov-20
</commit_message>
<xml_diff>
--- a/Power Points/Python.pptx
+++ b/Power Points/Python.pptx
@@ -242,7 +242,7 @@
           <a:p>
             <a:fld id="{51A969EA-8566-418D-AC96-BC5F6E9FAB6C}" type="datetimeFigureOut">
               <a:rPr lang="en-US" smtClean="0"/>
-              <a:t>11/18/18</a:t>
+              <a:t>11/20/18</a:t>
             </a:fld>
             <a:endParaRPr lang="en-US"/>
           </a:p>
@@ -407,7 +407,7 @@
           <a:p>
             <a:fld id="{33B07B4B-74D8-4C42-A719-1F93879497F8}" type="datetimeFigureOut">
               <a:rPr lang="en-US" smtClean="0"/>
-              <a:t>11/18/18</a:t>
+              <a:t>11/20/18</a:t>
             </a:fld>
             <a:endParaRPr lang="en-US"/>
           </a:p>
@@ -2386,7 +2386,7 @@
           <a:p>
             <a:fld id="{B65C9255-9F07-4181-9AD2-897FFC0A3B7E}" type="datetimeFigureOut">
               <a:rPr lang="en-US" smtClean="0"/>
-              <a:t>11/18/18</a:t>
+              <a:t>11/20/18</a:t>
             </a:fld>
             <a:endParaRPr lang="en-US"/>
           </a:p>
@@ -2588,7 +2588,7 @@
           <a:p>
             <a:fld id="{B65C9255-9F07-4181-9AD2-897FFC0A3B7E}" type="datetimeFigureOut">
               <a:rPr lang="en-US" smtClean="0"/>
-              <a:t>11/18/18</a:t>
+              <a:t>11/20/18</a:t>
             </a:fld>
             <a:endParaRPr lang="en-US"/>
           </a:p>
@@ -2811,7 +2811,7 @@
           <a:p>
             <a:fld id="{B65C9255-9F07-4181-9AD2-897FFC0A3B7E}" type="datetimeFigureOut">
               <a:rPr lang="en-US" smtClean="0"/>
-              <a:t>11/18/18</a:t>
+              <a:t>11/20/18</a:t>
             </a:fld>
             <a:endParaRPr lang="en-US"/>
           </a:p>
@@ -7182,7 +7182,7 @@
           <a:p>
             <a:r>
               <a:rPr lang="en-US"/>
-              <a:t>loop executes 4 times</a:t>
+              <a:t>loop executes 5 times</a:t>
             </a:r>
           </a:p>
           <a:p>

</xml_diff>